<commit_message>
HTML: HTMLComments: Bit arrangements
</commit_message>
<xml_diff>
--- a/HTML Comments.pptx
+++ b/HTML Comments.pptx
@@ -3423,8 +3423,8 @@
         </p:nvSpPr>
         <p:spPr>
           <a:xfrm>
-            <a:off x="402770" y="1804548"/>
-            <a:ext cx="11146971" cy="3248903"/>
+            <a:off x="522514" y="1430475"/>
+            <a:ext cx="11146971" cy="3657220"/>
           </a:xfrm>
           <a:prstGeom prst="rect">
             <a:avLst/>
@@ -3554,6 +3554,16 @@
               </a:rPr>
               <a:t>You can add comments to your HTML source by using the syntax:</a:t>
             </a:r>
+          </a:p>
+          <a:p>
+            <a:pPr algn="just">
+              <a:lnSpc>
+                <a:spcPct val="115000"/>
+              </a:lnSpc>
+              <a:spcAft>
+                <a:spcPts val="700"/>
+              </a:spcAft>
+            </a:pPr>
             <a:endParaRPr lang="en-NP" sz="1800" kern="150" dirty="0">
               <a:effectLst/>
               <a:latin typeface="Liberation Serif"/>
@@ -3683,13 +3693,13 @@
           <p:nvPr>
             <p:extLst>
               <p:ext uri="{D42A27DB-BD31-4B8C-83A1-F6EECF244321}">
-                <p14:modId xmlns:p14="http://schemas.microsoft.com/office/powerpoint/2010/main" val="1381063458"/>
+                <p14:modId xmlns:p14="http://schemas.microsoft.com/office/powerpoint/2010/main" val="2909017526"/>
               </p:ext>
             </p:extLst>
           </p:nvPr>
         </p:nvGraphicFramePr>
         <p:xfrm>
-          <a:off x="217714" y="878486"/>
+          <a:off x="217713" y="1469578"/>
           <a:ext cx="3962400" cy="1777365"/>
         </p:xfrm>
         <a:graphic>
@@ -3831,8 +3841,8 @@
         </p:nvSpPr>
         <p:spPr bwMode="auto">
           <a:xfrm>
-            <a:off x="0" y="0"/>
-            <a:ext cx="12192000" cy="923330"/>
+            <a:off x="217713" y="250425"/>
+            <a:ext cx="12192000" cy="1200329"/>
           </a:xfrm>
           <a:prstGeom prst="rect">
             <a:avLst/>
@@ -3880,6 +3890,63 @@
           </a:bodyPr>
           <a:lstStyle/>
           <a:p>
+            <a:pPr marL="285750" marR="0" lvl="0" indent="-285750" algn="l" defTabSz="914400" rtl="0" eaLnBrk="0" fontAlgn="base" latinLnBrk="0" hangingPunct="0">
+              <a:lnSpc>
+                <a:spcPct val="100000"/>
+              </a:lnSpc>
+              <a:spcBef>
+                <a:spcPct val="0"/>
+              </a:spcBef>
+              <a:spcAft>
+                <a:spcPct val="0"/>
+              </a:spcAft>
+              <a:buClrTx/>
+              <a:buSzTx/>
+              <a:buFont typeface="Arial" panose="020B0604020202020204" pitchFamily="34" charset="0"/>
+              <a:buChar char="•"/>
+              <a:tabLst/>
+            </a:pPr>
+            <a:r>
+              <a:rPr kumimoji="0" lang="en-US" altLang="zh-CN" b="0" i="0" u="none" strike="noStrike" cap="none" normalizeH="0" baseline="0" dirty="0">
+                <a:ln>
+                  <a:noFill/>
+                </a:ln>
+                <a:solidFill>
+                  <a:schemeClr val="tx1"/>
+                </a:solidFill>
+                <a:effectLst/>
+                <a:ea typeface="Source Han Sans CN"/>
+                <a:cs typeface="Noto Sans Devanagari" panose="020B0502040504020204" pitchFamily="34" charset="0"/>
+              </a:rPr>
+              <a:t>Examples:</a:t>
+            </a:r>
+          </a:p>
+          <a:p>
+            <a:pPr marR="0" lvl="0" algn="l" defTabSz="914400" rtl="0" eaLnBrk="0" fontAlgn="base" latinLnBrk="0" hangingPunct="0">
+              <a:lnSpc>
+                <a:spcPct val="100000"/>
+              </a:lnSpc>
+              <a:spcBef>
+                <a:spcPct val="0"/>
+              </a:spcBef>
+              <a:spcAft>
+                <a:spcPct val="0"/>
+              </a:spcAft>
+              <a:buClrTx/>
+              <a:buSzTx/>
+              <a:tabLst/>
+            </a:pPr>
+            <a:endParaRPr kumimoji="0" lang="en-US" altLang="zh-CN" b="0" i="0" u="none" strike="noStrike" cap="none" normalizeH="0" baseline="0" dirty="0">
+              <a:ln>
+                <a:noFill/>
+              </a:ln>
+              <a:solidFill>
+                <a:schemeClr val="tx1"/>
+              </a:solidFill>
+              <a:effectLst/>
+            </a:endParaRPr>
+          </a:p>
+          <a:p>
             <a:pPr marL="0" marR="0" lvl="0" indent="0" algn="l" defTabSz="914400" rtl="0" eaLnBrk="0" fontAlgn="base" latinLnBrk="0" hangingPunct="0">
               <a:lnSpc>
                 <a:spcPct val="100000"/>
@@ -3908,7 +3975,7 @@
                 <a:ea typeface="Source Han Sans CN"/>
                 <a:cs typeface="Noto Sans Devanagari" panose="020B0502040504020204" pitchFamily="34" charset="0"/>
               </a:rPr>
-              <a:t>* Examples:</a:t>
+              <a:t>- If we want to comment certain things.</a:t>
             </a:r>
             <a:endParaRPr kumimoji="0" lang="en-US" altLang="zh-CN" b="0" i="0" u="none" strike="noStrike" cap="none" normalizeH="0" baseline="0" dirty="0">
               <a:ln>
@@ -3937,20 +4004,6 @@
               <a:buNone/>
               <a:tabLst/>
             </a:pPr>
-            <a:r>
-              <a:rPr kumimoji="0" lang="en-US" altLang="zh-CN" b="0" i="0" u="none" strike="noStrike" cap="none" normalizeH="0" baseline="0" dirty="0">
-                <a:ln>
-                  <a:noFill/>
-                </a:ln>
-                <a:solidFill>
-                  <a:schemeClr val="tx1"/>
-                </a:solidFill>
-                <a:effectLst/>
-                <a:ea typeface="Source Han Sans CN"/>
-                <a:cs typeface="Noto Sans Devanagari" panose="020B0502040504020204" pitchFamily="34" charset="0"/>
-              </a:rPr>
-              <a:t>- If we want to comment certain things.</a:t>
-            </a:r>
             <a:endParaRPr kumimoji="0" lang="en-US" altLang="zh-CN" b="0" i="0" u="none" strike="noStrike" cap="none" normalizeH="0" baseline="0" dirty="0">
               <a:ln>
                 <a:noFill/>
@@ -3961,33 +4014,6 @@
               <a:effectLst/>
             </a:endParaRPr>
           </a:p>
-          <a:p>
-            <a:pPr marL="0" marR="0" lvl="0" indent="0" algn="l" defTabSz="914400" rtl="0" eaLnBrk="0" fontAlgn="base" latinLnBrk="0" hangingPunct="0">
-              <a:lnSpc>
-                <a:spcPct val="100000"/>
-              </a:lnSpc>
-              <a:spcBef>
-                <a:spcPct val="0"/>
-              </a:spcBef>
-              <a:spcAft>
-                <a:spcPct val="0"/>
-              </a:spcAft>
-              <a:buClrTx/>
-              <a:buSzTx/>
-              <a:buFontTx/>
-              <a:buNone/>
-              <a:tabLst/>
-            </a:pPr>
-            <a:endParaRPr kumimoji="0" lang="en-US" altLang="zh-CN" b="0" i="0" u="none" strike="noStrike" cap="none" normalizeH="0" baseline="0" dirty="0">
-              <a:ln>
-                <a:noFill/>
-              </a:ln>
-              <a:solidFill>
-                <a:schemeClr val="tx1"/>
-              </a:solidFill>
-              <a:effectLst/>
-            </a:endParaRPr>
-          </a:p>
         </p:txBody>
       </p:sp>
       <p:sp>
@@ -4004,7 +4030,7 @@
         </p:nvSpPr>
         <p:spPr>
           <a:xfrm>
-            <a:off x="76200" y="2763798"/>
+            <a:off x="217713" y="3646471"/>
             <a:ext cx="5770811" cy="369332"/>
           </a:xfrm>
           <a:prstGeom prst="rect">
@@ -4052,14 +4078,14 @@
           <p:nvPr>
             <p:extLst>
               <p:ext uri="{D42A27DB-BD31-4B8C-83A1-F6EECF244321}">
-                <p14:modId xmlns:p14="http://schemas.microsoft.com/office/powerpoint/2010/main" val="2191781475"/>
+                <p14:modId xmlns:p14="http://schemas.microsoft.com/office/powerpoint/2010/main" val="897230456"/>
               </p:ext>
             </p:extLst>
           </p:nvPr>
         </p:nvGraphicFramePr>
         <p:xfrm>
-          <a:off x="217714" y="3331028"/>
-          <a:ext cx="3102429" cy="1068621"/>
+          <a:off x="217713" y="4465880"/>
+          <a:ext cx="3962400" cy="1430992"/>
         </p:xfrm>
         <a:graphic>
           <a:graphicData uri="http://schemas.openxmlformats.org/drawingml/2006/table">
@@ -4068,7 +4094,7 @@
                 <a:tableStyleId>{5C22544A-7EE6-4342-B048-85BDC9FD1C3A}</a:tableStyleId>
               </a:tblPr>
               <a:tblGrid>
-                <a:gridCol w="3102429">
+                <a:gridCol w="3962400">
                   <a:extLst>
                     <a:ext uri="{9D8B030D-6E8A-4147-A177-3AD203B41FA5}">
                       <a16:colId xmlns:a16="http://schemas.microsoft.com/office/drawing/2014/main" val="1738973175"/>
@@ -4076,7 +4102,7 @@
                   </a:extLst>
                 </a:gridCol>
               </a:tblGrid>
-              <a:tr h="1068621">
+              <a:tr h="1430992">
                 <a:tc>
                   <a:txBody>
                     <a:bodyPr/>
@@ -4334,7 +4360,7 @@
         </p:nvSpPr>
         <p:spPr>
           <a:xfrm>
-            <a:off x="0" y="0"/>
+            <a:off x="314695" y="275839"/>
             <a:ext cx="5450659" cy="369332"/>
           </a:xfrm>
           <a:prstGeom prst="rect">
@@ -4382,13 +4408,13 @@
           <p:nvPr>
             <p:extLst>
               <p:ext uri="{D42A27DB-BD31-4B8C-83A1-F6EECF244321}">
-                <p14:modId xmlns:p14="http://schemas.microsoft.com/office/powerpoint/2010/main" val="1421042562"/>
+                <p14:modId xmlns:p14="http://schemas.microsoft.com/office/powerpoint/2010/main" val="2613190373"/>
               </p:ext>
             </p:extLst>
           </p:nvPr>
         </p:nvGraphicFramePr>
         <p:xfrm>
-          <a:off x="314696" y="369332"/>
+          <a:off x="314695" y="851245"/>
           <a:ext cx="2951459" cy="1463739"/>
         </p:xfrm>
         <a:graphic>
@@ -4536,7 +4562,7 @@
         </p:nvSpPr>
         <p:spPr>
           <a:xfrm>
-            <a:off x="314696" y="2202403"/>
+            <a:off x="314696" y="2521058"/>
             <a:ext cx="1475729" cy="369332"/>
           </a:xfrm>
           <a:prstGeom prst="rect">
@@ -4572,13 +4598,13 @@
           <p:nvPr>
             <p:extLst>
               <p:ext uri="{D42A27DB-BD31-4B8C-83A1-F6EECF244321}">
-                <p14:modId xmlns:p14="http://schemas.microsoft.com/office/powerpoint/2010/main" val="578710994"/>
+                <p14:modId xmlns:p14="http://schemas.microsoft.com/office/powerpoint/2010/main" val="943848161"/>
               </p:ext>
             </p:extLst>
           </p:nvPr>
         </p:nvGraphicFramePr>
         <p:xfrm>
-          <a:off x="314696" y="2663555"/>
+          <a:off x="314696" y="3105578"/>
           <a:ext cx="2951459" cy="2361375"/>
         </p:xfrm>
         <a:graphic>

</xml_diff>